<commit_message>
Minor changes to overview slides
</commit_message>
<xml_diff>
--- a/Overview.pptx
+++ b/Overview.pptx
@@ -4768,15 +4768,7 @@
           <a:p>
             <a:r>
               <a:rPr lang="en-US" dirty="0" smtClean="0"/>
-              <a:t>Python </a:t>
-            </a:r>
-            <a:r>
-              <a:rPr lang="en-US" dirty="0" smtClean="0"/>
-              <a:t>Background </a:t>
-            </a:r>
-            <a:r>
-              <a:rPr lang="en-US" dirty="0" smtClean="0"/>
-              <a:t>material</a:t>
+              <a:t>Python Background material</a:t>
             </a:r>
             <a:endParaRPr lang="en-US" dirty="0"/>
           </a:p>
@@ -4903,13 +4895,7 @@
               <a:rPr lang="en-US" sz="2400" dirty="0" smtClean="0">
                 <a:hlinkClick r:id="rId9"/>
               </a:rPr>
-              <a:t>Why Python is the Next Wave in Earth Sciences </a:t>
-            </a:r>
-            <a:r>
-              <a:rPr lang="en-US" sz="2400" dirty="0" smtClean="0">
-                <a:hlinkClick r:id="rId9"/>
-              </a:rPr>
-              <a:t>Computing</a:t>
+              <a:t>Why Python is the Next Wave in Earth Sciences Computing</a:t>
             </a:r>
             <a:endParaRPr lang="en-US" sz="2400" dirty="0" smtClean="0"/>
           </a:p>
@@ -5119,7 +5105,26 @@
           <a:p>
             <a:r>
               <a:rPr lang="en-US" dirty="0" smtClean="0"/>
-              <a:t>Lets Get Started - Today We Will …</a:t>
+              <a:t>Let’s </a:t>
+            </a:r>
+            <a:r>
+              <a:rPr lang="en-US" dirty="0" smtClean="0"/>
+              <a:t>Get </a:t>
+            </a:r>
+            <a:r>
+              <a:rPr lang="en-US" dirty="0" smtClean="0"/>
+              <a:t>Started</a:t>
+            </a:r>
+            <a:br>
+              <a:rPr lang="en-US" dirty="0" smtClean="0"/>
+            </a:br>
+            <a:r>
+              <a:rPr lang="en-US" dirty="0" smtClean="0"/>
+              <a:t>Today </a:t>
+            </a:r>
+            <a:r>
+              <a:rPr lang="en-US" dirty="0" smtClean="0"/>
+              <a:t>We Will …</a:t>
             </a:r>
             <a:endParaRPr lang="en-US" dirty="0"/>
           </a:p>
@@ -5137,8 +5142,8 @@
         </p:nvSpPr>
         <p:spPr>
           <a:xfrm>
-            <a:off x="457200" y="1600200"/>
-            <a:ext cx="8309610" cy="4525963"/>
+            <a:off x="457200" y="1851660"/>
+            <a:ext cx="8309610" cy="4274503"/>
           </a:xfrm>
         </p:spPr>
         <p:txBody>
@@ -6526,8 +6531,8 @@
         </p:blipFill>
         <p:spPr bwMode="auto">
           <a:xfrm>
-            <a:off x="5520690" y="2172373"/>
-            <a:ext cx="3611880" cy="4674197"/>
+            <a:off x="5589270" y="2261124"/>
+            <a:ext cx="3543300" cy="4585446"/>
           </a:xfrm>
           <a:prstGeom prst="rect">
             <a:avLst/>
@@ -6789,9 +6794,16 @@
             <a:endParaRPr lang="en-US" dirty="0" smtClean="0"/>
           </a:p>
           <a:p>
+            <a:endParaRPr lang="en-US" dirty="0" smtClean="0"/>
+          </a:p>
+          <a:p>
             <a:r>
               <a:rPr lang="en-US" dirty="0" smtClean="0"/>
-              <a:t>Requests from Unidata community for   Python support</a:t>
+              <a:t>Requests </a:t>
+            </a:r>
+            <a:r>
+              <a:rPr lang="en-US" dirty="0" smtClean="0"/>
+              <a:t>from Unidata community for   Python support</a:t>
             </a:r>
           </a:p>
         </p:txBody>
@@ -6805,7 +6817,7 @@
           <p:nvPr/>
         </p:nvGraphicFramePr>
         <p:xfrm>
-          <a:off x="1325880" y="3348988"/>
+          <a:off x="1360170" y="3566158"/>
           <a:ext cx="6720840" cy="1471932"/>
         </p:xfrm>
         <a:graphic>

</xml_diff>

<commit_message>
Minor changes to overview slides (switch nc-C arch diagram).
</commit_message>
<xml_diff>
--- a/Overview.pptx
+++ b/Overview.pptx
@@ -14,7 +14,7 @@
     <p:sldId id="322" r:id="rId5"/>
     <p:sldId id="324" r:id="rId6"/>
     <p:sldId id="341" r:id="rId7"/>
-    <p:sldId id="339" r:id="rId8"/>
+    <p:sldId id="344" r:id="rId8"/>
     <p:sldId id="332" r:id="rId9"/>
     <p:sldId id="335" r:id="rId10"/>
     <p:sldId id="327" r:id="rId11"/>
@@ -156,6 +156,7 @@
 
 <file path=ppt/charts/chart1.xml><?xml version="1.0" encoding="utf-8"?>
 <c:chartSpace xmlns:c="http://schemas.openxmlformats.org/drawingml/2006/chart" xmlns:a="http://schemas.openxmlformats.org/drawingml/2006/main" xmlns:r="http://schemas.openxmlformats.org/officeDocument/2006/relationships">
+  <c:date1904 val="1"/>
   <c:lang val="en-US"/>
   <c:chart>
     <c:plotArea>
@@ -361,25 +362,25 @@
           </c:val>
         </c:ser>
         <c:marker val="1"/>
-        <c:axId val="82666240"/>
-        <c:axId val="82667776"/>
+        <c:axId val="65434752"/>
+        <c:axId val="65436288"/>
       </c:lineChart>
       <c:catAx>
-        <c:axId val="82666240"/>
+        <c:axId val="65434752"/>
         <c:scaling>
           <c:orientation val="minMax"/>
         </c:scaling>
         <c:axPos val="b"/>
         <c:numFmt formatCode="General" sourceLinked="1"/>
         <c:tickLblPos val="nextTo"/>
-        <c:crossAx val="82667776"/>
+        <c:crossAx val="65436288"/>
         <c:crosses val="autoZero"/>
         <c:auto val="1"/>
         <c:lblAlgn val="ctr"/>
         <c:lblOffset val="100"/>
       </c:catAx>
       <c:valAx>
-        <c:axId val="82667776"/>
+        <c:axId val="65436288"/>
         <c:scaling>
           <c:orientation val="minMax"/>
         </c:scaling>
@@ -387,7 +388,7 @@
         <c:majorGridlines/>
         <c:numFmt formatCode="General" sourceLinked="1"/>
         <c:tickLblPos val="nextTo"/>
-        <c:crossAx val="82666240"/>
+        <c:crossAx val="65434752"/>
         <c:crosses val="autoZero"/>
         <c:crossBetween val="between"/>
       </c:valAx>
@@ -505,7 +506,7 @@
             <a:fld id="{D0858862-58BF-44B0-8200-136196B2F4C7}" type="datetimeFigureOut">
               <a:rPr lang="en-US"/>
               <a:pPr/>
-              <a:t>10/2/2014</a:t>
+              <a:t>10/6/2014</a:t>
             </a:fld>
             <a:endParaRPr lang="en-US"/>
           </a:p>
@@ -1147,7 +1148,7 @@
             <a:fld id="{F30AFB2F-5EF3-4CAB-B2FE-BA0A39E220C6}" type="datetimeFigureOut">
               <a:rPr lang="en-US"/>
               <a:pPr/>
-              <a:t>10/2/2014</a:t>
+              <a:t>10/6/2014</a:t>
             </a:fld>
             <a:endParaRPr lang="en-US"/>
           </a:p>
@@ -1329,7 +1330,7 @@
             <a:fld id="{778D11B3-B33D-4421-B117-CBEAEEDF3B56}" type="datetimeFigureOut">
               <a:rPr lang="en-US"/>
               <a:pPr/>
-              <a:t>10/2/2014</a:t>
+              <a:t>10/6/2014</a:t>
             </a:fld>
             <a:endParaRPr lang="en-US"/>
           </a:p>
@@ -1521,7 +1522,7 @@
             <a:fld id="{E546F523-601C-4AE6-94D0-B6E0B6B185B6}" type="datetimeFigureOut">
               <a:rPr lang="en-US"/>
               <a:pPr/>
-              <a:t>10/2/2014</a:t>
+              <a:t>10/6/2014</a:t>
             </a:fld>
             <a:endParaRPr lang="en-US"/>
           </a:p>
@@ -1703,7 +1704,7 @@
             <a:fld id="{2755933F-A7CD-46E1-AE74-F4B25B8A5888}" type="datetimeFigureOut">
               <a:rPr lang="en-US"/>
               <a:pPr/>
-              <a:t>10/2/2014</a:t>
+              <a:t>10/6/2014</a:t>
             </a:fld>
             <a:endParaRPr lang="en-US"/>
           </a:p>
@@ -1961,7 +1962,7 @@
             <a:fld id="{E2DD70BF-DD26-4542-8867-0654A849CEFE}" type="datetimeFigureOut">
               <a:rPr lang="en-US"/>
               <a:pPr/>
-              <a:t>10/2/2014</a:t>
+              <a:t>10/6/2014</a:t>
             </a:fld>
             <a:endParaRPr lang="en-US"/>
           </a:p>
@@ -2261,7 +2262,7 @@
             <a:fld id="{80E5E274-32FD-4A30-AF3B-64174B6C2069}" type="datetimeFigureOut">
               <a:rPr lang="en-US"/>
               <a:pPr/>
-              <a:t>10/2/2014</a:t>
+              <a:t>10/6/2014</a:t>
             </a:fld>
             <a:endParaRPr lang="en-US"/>
           </a:p>
@@ -2695,7 +2696,7 @@
             <a:fld id="{02E83F24-3119-487E-BFBC-C70771716A50}" type="datetimeFigureOut">
               <a:rPr lang="en-US"/>
               <a:pPr/>
-              <a:t>10/2/2014</a:t>
+              <a:t>10/6/2014</a:t>
             </a:fld>
             <a:endParaRPr lang="en-US"/>
           </a:p>
@@ -2825,7 +2826,7 @@
             <a:fld id="{68DD7F26-701B-47E4-A59A-055252B49D89}" type="datetimeFigureOut">
               <a:rPr lang="en-US"/>
               <a:pPr/>
-              <a:t>10/2/2014</a:t>
+              <a:t>10/6/2014</a:t>
             </a:fld>
             <a:endParaRPr lang="en-US"/>
           </a:p>
@@ -2932,7 +2933,7 @@
             <a:fld id="{CACE95DC-D4F0-4723-9A98-48338ADC933B}" type="datetimeFigureOut">
               <a:rPr lang="en-US"/>
               <a:pPr/>
-              <a:t>10/2/2014</a:t>
+              <a:t>10/6/2014</a:t>
             </a:fld>
             <a:endParaRPr lang="en-US"/>
           </a:p>
@@ -3221,7 +3222,7 @@
             <a:fld id="{E253DCD9-B885-4B2F-841C-5BE81A85EC36}" type="datetimeFigureOut">
               <a:rPr lang="en-US"/>
               <a:pPr/>
-              <a:t>10/2/2014</a:t>
+              <a:t>10/6/2014</a:t>
             </a:fld>
             <a:endParaRPr lang="en-US"/>
           </a:p>
@@ -3489,7 +3490,7 @@
             <a:fld id="{292D2DE9-A858-4AF6-BFB6-E7BE7517C326}" type="datetimeFigureOut">
               <a:rPr lang="en-US"/>
               <a:pPr/>
-              <a:t>10/2/2014</a:t>
+              <a:t>10/6/2014</a:t>
             </a:fld>
             <a:endParaRPr lang="en-US"/>
           </a:p>
@@ -3731,7 +3732,7 @@
             <a:fld id="{28771537-7EF8-4AE1-AA34-66E7A6D640CE}" type="datetimeFigureOut">
               <a:rPr lang="en-US"/>
               <a:pPr/>
-              <a:t>10/2/2014</a:t>
+              <a:t>10/6/2014</a:t>
             </a:fld>
             <a:endParaRPr lang="en-US"/>
           </a:p>
@@ -5059,13 +5060,7 @@
               <a:rPr lang="en-US" sz="2400" dirty="0" smtClean="0">
                 <a:hlinkClick r:id="rId6"/>
               </a:rPr>
-              <a:t>Python Scientific Lecture </a:t>
-            </a:r>
-            <a:r>
-              <a:rPr lang="en-US" sz="2400" dirty="0" smtClean="0">
-                <a:hlinkClick r:id="rId6"/>
-              </a:rPr>
-              <a:t>Notes</a:t>
+              <a:t>Python Scientific Lecture Notes</a:t>
             </a:r>
             <a:endParaRPr lang="en-US" sz="2400" dirty="0" smtClean="0"/>
           </a:p>
@@ -5338,11 +5333,7 @@
             </a:r>
             <a:r>
               <a:rPr lang="en-US" dirty="0" smtClean="0"/>
-              <a:t> to </a:t>
-            </a:r>
-            <a:r>
-              <a:rPr lang="en-US" dirty="0" smtClean="0"/>
-              <a:t>visualize </a:t>
+              <a:t> to visualize </a:t>
             </a:r>
             <a:r>
               <a:rPr lang="en-US" dirty="0" err="1" smtClean="0"/>
@@ -5362,29 +5353,13 @@
           <a:p>
             <a:r>
               <a:rPr lang="en-US" dirty="0" smtClean="0"/>
-              <a:t>Read </a:t>
-            </a:r>
+              <a:t>Read Radar Level 2 data</a:t>
+            </a:r>
+          </a:p>
+          <a:p>
             <a:r>
               <a:rPr lang="en-US" dirty="0" smtClean="0"/>
-              <a:t>Radar Level 2 data</a:t>
-            </a:r>
-          </a:p>
-          <a:p>
-            <a:r>
-              <a:rPr lang="en-US" dirty="0" smtClean="0"/>
-              <a:t>Request maps </a:t>
-            </a:r>
-            <a:r>
-              <a:rPr lang="en-US" dirty="0" smtClean="0"/>
-              <a:t>from </a:t>
-            </a:r>
-            <a:r>
-              <a:rPr lang="en-US" dirty="0" smtClean="0"/>
-              <a:t>an OGC WMS </a:t>
-            </a:r>
-            <a:r>
-              <a:rPr lang="en-US" dirty="0" smtClean="0"/>
-              <a:t>server</a:t>
+              <a:t>Request maps from an OGC WMS server</a:t>
             </a:r>
           </a:p>
           <a:p>
@@ -6633,7 +6608,7 @@
       </p:grpSpPr>
       <p:pic>
         <p:nvPicPr>
-          <p:cNvPr id="26628" name="Picture 4" descr="netcdf_architecture.png"/>
+          <p:cNvPr id="26626" name="Picture 2" descr="nc-classic-uml.png"/>
           <p:cNvPicPr>
             <a:picLocks noChangeAspect="1" noChangeArrowheads="1"/>
           </p:cNvPicPr>
@@ -6648,8 +6623,8 @@
         </p:blipFill>
         <p:spPr bwMode="auto">
           <a:xfrm>
-            <a:off x="5143500" y="1684245"/>
-            <a:ext cx="3989070" cy="5162325"/>
+            <a:off x="136486" y="3687093"/>
+            <a:ext cx="4134767" cy="2848395"/>
           </a:xfrm>
           <a:prstGeom prst="rect">
             <a:avLst/>
@@ -6657,6 +6632,30 @@
           <a:noFill/>
         </p:spPr>
       </p:pic>
+      <p:pic>
+        <p:nvPicPr>
+          <p:cNvPr id="6" name="Picture 5" descr="netcdf_architecture.png"/>
+          <p:cNvPicPr>
+            <a:picLocks noChangeAspect="1"/>
+          </p:cNvPicPr>
+          <p:nvPr/>
+        </p:nvPicPr>
+        <p:blipFill>
+          <a:blip r:embed="rId3" cstate="print"/>
+          <a:stretch>
+            <a:fillRect/>
+          </a:stretch>
+        </p:blipFill>
+        <p:spPr>
+          <a:xfrm>
+            <a:off x="4021365" y="3283977"/>
+            <a:ext cx="5135545" cy="3079369"/>
+          </a:xfrm>
+          <a:prstGeom prst="rect">
+            <a:avLst/>
+          </a:prstGeom>
+        </p:spPr>
+      </p:pic>
       <p:sp>
         <p:nvSpPr>
           <p:cNvPr id="2" name="Title 1"/>
@@ -6729,32 +6728,66 @@
           </a:p>
         </p:txBody>
       </p:sp>
-      <p:pic>
-        <p:nvPicPr>
-          <p:cNvPr id="26626" name="Picture 2" descr="nc-classic-uml.png"/>
-          <p:cNvPicPr>
-            <a:picLocks noChangeAspect="1" noChangeArrowheads="1"/>
-          </p:cNvPicPr>
+      <p:sp>
+        <p:nvSpPr>
+          <p:cNvPr id="7" name="TextBox 6"/>
+          <p:cNvSpPr txBox="1"/>
           <p:nvPr/>
-        </p:nvPicPr>
-        <p:blipFill>
-          <a:blip r:embed="rId3" cstate="print"/>
-          <a:srcRect/>
-          <a:stretch>
-            <a:fillRect/>
-          </a:stretch>
-        </p:blipFill>
-        <p:spPr bwMode="auto">
+        </p:nvSpPr>
+        <p:spPr>
           <a:xfrm>
-            <a:off x="470773" y="3406140"/>
-            <a:ext cx="4399881" cy="3031029"/>
+            <a:off x="6125499" y="3018500"/>
+            <a:ext cx="1790875" cy="246221"/>
           </a:xfrm>
           <a:prstGeom prst="rect">
             <a:avLst/>
           </a:prstGeom>
           <a:noFill/>
         </p:spPr>
-      </p:pic>
+        <p:txBody>
+          <a:bodyPr wrap="none" rtlCol="0">
+            <a:spAutoFit/>
+          </a:bodyPr>
+          <a:lstStyle/>
+          <a:p>
+            <a:r>
+              <a:rPr lang="en-US" sz="1000" dirty="0" smtClean="0"/>
+              <a:t>NetCDF Library Architecture</a:t>
+            </a:r>
+            <a:endParaRPr lang="en-US" sz="1000" dirty="0"/>
+          </a:p>
+        </p:txBody>
+      </p:sp>
+      <p:sp>
+        <p:nvSpPr>
+          <p:cNvPr id="8" name="TextBox 7"/>
+          <p:cNvSpPr txBox="1"/>
+          <p:nvPr/>
+        </p:nvSpPr>
+        <p:spPr>
+          <a:xfrm>
+            <a:off x="762044" y="3426539"/>
+            <a:ext cx="1691489" cy="246221"/>
+          </a:xfrm>
+          <a:prstGeom prst="rect">
+            <a:avLst/>
+          </a:prstGeom>
+          <a:noFill/>
+        </p:spPr>
+        <p:txBody>
+          <a:bodyPr wrap="none" rtlCol="0">
+            <a:spAutoFit/>
+          </a:bodyPr>
+          <a:lstStyle/>
+          <a:p>
+            <a:r>
+              <a:rPr lang="en-US" sz="1000" dirty="0" smtClean="0"/>
+              <a:t>NetCDF Class Data Model</a:t>
+            </a:r>
+            <a:endParaRPr lang="en-US" sz="1000" dirty="0"/>
+          </a:p>
+        </p:txBody>
+      </p:sp>
     </p:spTree>
   </p:cSld>
   <p:clrMapOvr>

</xml_diff>